<commit_message>
add (unfinished) flowchart and RECORD checklist
</commit_message>
<xml_diff>
--- a/write-up/manuscript/flowchart.pptx
+++ b/write-up/manuscript/flowchart.pptx
@@ -243,7 +243,7 @@
           <a:p>
             <a:fld id="{83FBA736-8A49-4B74-85CF-8B87B612C01C}" type="datetimeFigureOut">
               <a:rPr lang="en-GB" smtClean="0"/>
-              <a:t>18/07/2022</a:t>
+              <a:t>31/01/2024</a:t>
             </a:fld>
             <a:endParaRPr lang="en-GB"/>
           </a:p>
@@ -413,7 +413,7 @@
           <a:p>
             <a:fld id="{83FBA736-8A49-4B74-85CF-8B87B612C01C}" type="datetimeFigureOut">
               <a:rPr lang="en-GB" smtClean="0"/>
-              <a:t>18/07/2022</a:t>
+              <a:t>31/01/2024</a:t>
             </a:fld>
             <a:endParaRPr lang="en-GB"/>
           </a:p>
@@ -593,7 +593,7 @@
           <a:p>
             <a:fld id="{83FBA736-8A49-4B74-85CF-8B87B612C01C}" type="datetimeFigureOut">
               <a:rPr lang="en-GB" smtClean="0"/>
-              <a:t>18/07/2022</a:t>
+              <a:t>31/01/2024</a:t>
             </a:fld>
             <a:endParaRPr lang="en-GB"/>
           </a:p>
@@ -763,7 +763,7 @@
           <a:p>
             <a:fld id="{83FBA736-8A49-4B74-85CF-8B87B612C01C}" type="datetimeFigureOut">
               <a:rPr lang="en-GB" smtClean="0"/>
-              <a:t>18/07/2022</a:t>
+              <a:t>31/01/2024</a:t>
             </a:fld>
             <a:endParaRPr lang="en-GB"/>
           </a:p>
@@ -1007,7 +1007,7 @@
           <a:p>
             <a:fld id="{83FBA736-8A49-4B74-85CF-8B87B612C01C}" type="datetimeFigureOut">
               <a:rPr lang="en-GB" smtClean="0"/>
-              <a:t>18/07/2022</a:t>
+              <a:t>31/01/2024</a:t>
             </a:fld>
             <a:endParaRPr lang="en-GB"/>
           </a:p>
@@ -1239,7 +1239,7 @@
           <a:p>
             <a:fld id="{83FBA736-8A49-4B74-85CF-8B87B612C01C}" type="datetimeFigureOut">
               <a:rPr lang="en-GB" smtClean="0"/>
-              <a:t>18/07/2022</a:t>
+              <a:t>31/01/2024</a:t>
             </a:fld>
             <a:endParaRPr lang="en-GB"/>
           </a:p>
@@ -1606,7 +1606,7 @@
           <a:p>
             <a:fld id="{83FBA736-8A49-4B74-85CF-8B87B612C01C}" type="datetimeFigureOut">
               <a:rPr lang="en-GB" smtClean="0"/>
-              <a:t>18/07/2022</a:t>
+              <a:t>31/01/2024</a:t>
             </a:fld>
             <a:endParaRPr lang="en-GB"/>
           </a:p>
@@ -1724,7 +1724,7 @@
           <a:p>
             <a:fld id="{83FBA736-8A49-4B74-85CF-8B87B612C01C}" type="datetimeFigureOut">
               <a:rPr lang="en-GB" smtClean="0"/>
-              <a:t>18/07/2022</a:t>
+              <a:t>31/01/2024</a:t>
             </a:fld>
             <a:endParaRPr lang="en-GB"/>
           </a:p>
@@ -1819,7 +1819,7 @@
           <a:p>
             <a:fld id="{83FBA736-8A49-4B74-85CF-8B87B612C01C}" type="datetimeFigureOut">
               <a:rPr lang="en-GB" smtClean="0"/>
-              <a:t>18/07/2022</a:t>
+              <a:t>31/01/2024</a:t>
             </a:fld>
             <a:endParaRPr lang="en-GB"/>
           </a:p>
@@ -2096,7 +2096,7 @@
           <a:p>
             <a:fld id="{83FBA736-8A49-4B74-85CF-8B87B612C01C}" type="datetimeFigureOut">
               <a:rPr lang="en-GB" smtClean="0"/>
-              <a:t>18/07/2022</a:t>
+              <a:t>31/01/2024</a:t>
             </a:fld>
             <a:endParaRPr lang="en-GB"/>
           </a:p>
@@ -2353,7 +2353,7 @@
           <a:p>
             <a:fld id="{83FBA736-8A49-4B74-85CF-8B87B612C01C}" type="datetimeFigureOut">
               <a:rPr lang="en-GB" smtClean="0"/>
-              <a:t>18/07/2022</a:t>
+              <a:t>31/01/2024</a:t>
             </a:fld>
             <a:endParaRPr lang="en-GB"/>
           </a:p>
@@ -2566,7 +2566,7 @@
           <a:p>
             <a:fld id="{83FBA736-8A49-4B74-85CF-8B87B612C01C}" type="datetimeFigureOut">
               <a:rPr lang="en-GB" smtClean="0"/>
-              <a:t>18/07/2022</a:t>
+              <a:t>31/01/2024</a:t>
             </a:fld>
             <a:endParaRPr lang="en-GB"/>
           </a:p>
@@ -3099,27 +3099,35 @@
             <a:pPr algn="r"/>
             <a:r>
               <a:rPr lang="en-GB" sz="1100" dirty="0"/>
-              <a:t>Aged 18+ and received </a:t>
+              <a:t>Aged </a:t>
             </a:r>
             <a:r>
               <a:rPr lang="en-GB" sz="1100" dirty="0" smtClean="0"/>
-              <a:t>a booster </a:t>
+              <a:t>50+ </a:t>
             </a:r>
             <a:r>
               <a:rPr lang="en-GB" sz="1100" dirty="0"/>
-              <a:t>dose between </a:t>
+              <a:t>and received </a:t>
             </a:r>
             <a:r>
               <a:rPr lang="en-GB" sz="1100" dirty="0" smtClean="0"/>
-              <a:t>29 October 2021 </a:t>
+              <a:t>a </a:t>
+            </a:r>
+            <a:r>
+              <a:rPr lang="en-GB" sz="1100" dirty="0" smtClean="0"/>
+              <a:t>COVID-19 vaccine </a:t>
             </a:r>
             <a:r>
               <a:rPr lang="en-GB" sz="1100" dirty="0"/>
-              <a:t>and </a:t>
+              <a:t>between </a:t>
             </a:r>
             <a:r>
               <a:rPr lang="en-GB" sz="1100" dirty="0" smtClean="0"/>
-              <a:t>31 January 2022 inclusive</a:t>
+              <a:t>1 April and 30 June 2023 </a:t>
+            </a:r>
+            <a:r>
+              <a:rPr lang="en-GB" sz="1100" dirty="0" smtClean="0"/>
+              <a:t>inclusive</a:t>
             </a:r>
             <a:endParaRPr lang="en-GB" sz="1100" dirty="0"/>
           </a:p>
@@ -4052,7 +4060,6 @@
               <a:rPr lang="en-GB" sz="1100" dirty="0" smtClean="0"/>
               <a:t>4,736,094</a:t>
             </a:r>
-            <a:endParaRPr lang="en-GB" sz="1100" dirty="0" smtClean="0"/>
           </a:p>
           <a:p>
             <a:pPr algn="r"/>
@@ -4637,7 +4644,7 @@
             <a:pPr algn="r"/>
             <a:r>
               <a:rPr lang="en-GB" sz="1100" b="1" dirty="0" smtClean="0"/>
-              <a:t>BNT162b2</a:t>
+              <a:t>Pfizer BA.4-5</a:t>
             </a:r>
             <a:endParaRPr lang="en-GB" sz="1100" b="1" dirty="0"/>
           </a:p>
@@ -5868,7 +5875,7 @@
             <a:pPr algn="r"/>
             <a:r>
               <a:rPr lang="en-GB" sz="1100" b="1" dirty="0" smtClean="0"/>
-              <a:t>mRNA-1273</a:t>
+              <a:t>Sanofi</a:t>
             </a:r>
             <a:endParaRPr lang="en-GB" sz="1100" b="1" dirty="0"/>
           </a:p>

</xml_diff>